<commit_message>
added etl to ppt
</commit_message>
<xml_diff>
--- a/Presentation/slides-new.pptx
+++ b/Presentation/slides-new.pptx
@@ -6,21 +6,23 @@
   </p:sldMasterIdLst>
   <p:sldIdLst>
     <p:sldId id="267" r:id="rId2"/>
-    <p:sldId id="262" r:id="rId3"/>
-    <p:sldId id="261" r:id="rId4"/>
-    <p:sldId id="269" r:id="rId5"/>
-    <p:sldId id="259" r:id="rId6"/>
-    <p:sldId id="257" r:id="rId7"/>
-    <p:sldId id="258" r:id="rId8"/>
-    <p:sldId id="260" r:id="rId9"/>
-    <p:sldId id="268" r:id="rId10"/>
-    <p:sldId id="264" r:id="rId11"/>
-    <p:sldId id="265" r:id="rId12"/>
-    <p:sldId id="271" r:id="rId13"/>
-    <p:sldId id="263" r:id="rId14"/>
-    <p:sldId id="266" r:id="rId15"/>
-    <p:sldId id="272" r:id="rId16"/>
-    <p:sldId id="273" r:id="rId17"/>
+    <p:sldId id="274" r:id="rId3"/>
+    <p:sldId id="275" r:id="rId4"/>
+    <p:sldId id="262" r:id="rId5"/>
+    <p:sldId id="261" r:id="rId6"/>
+    <p:sldId id="269" r:id="rId7"/>
+    <p:sldId id="259" r:id="rId8"/>
+    <p:sldId id="257" r:id="rId9"/>
+    <p:sldId id="258" r:id="rId10"/>
+    <p:sldId id="260" r:id="rId11"/>
+    <p:sldId id="268" r:id="rId12"/>
+    <p:sldId id="264" r:id="rId13"/>
+    <p:sldId id="265" r:id="rId14"/>
+    <p:sldId id="271" r:id="rId15"/>
+    <p:sldId id="263" r:id="rId16"/>
+    <p:sldId id="266" r:id="rId17"/>
+    <p:sldId id="272" r:id="rId18"/>
+    <p:sldId id="273" r:id="rId19"/>
   </p:sldIdLst>
   <p:sldSz cx="12192000" cy="6858000"/>
   <p:notesSz cx="6858000" cy="9144000"/>
@@ -2777,6 +2779,60 @@
 </dgm:styleDef>
 </file>
 
+<file path=ppt/ink/ink1.xml><?xml version="1.0" encoding="utf-8"?>
+<inkml:ink xmlns:inkml="http://www.w3.org/2003/InkML">
+  <inkml:definitions>
+    <inkml:context xml:id="ctx0">
+      <inkml:inkSource xml:id="inkSrc0">
+        <inkml:traceFormat>
+          <inkml:channel name="X" type="integer" min="-2.14748E9" max="2.14748E9" units="cm"/>
+          <inkml:channel name="Y" type="integer" min="-2.14748E9" max="2.14748E9" units="cm"/>
+        </inkml:traceFormat>
+        <inkml:channelProperties>
+          <inkml:channelProperty channel="X" name="resolution" value="1000" units="1/cm"/>
+          <inkml:channelProperty channel="Y" name="resolution" value="1000" units="1/cm"/>
+        </inkml:channelProperties>
+      </inkml:inkSource>
+      <inkml:timestamp xml:id="ts0" timeString="2019-09-25T15:39:31.155"/>
+    </inkml:context>
+    <inkml:brush xml:id="br0">
+      <inkml:brushProperty name="width" value="0.05" units="cm"/>
+      <inkml:brushProperty name="height" value="0.05" units="cm"/>
+      <inkml:brushProperty name="color" value="#E71224"/>
+      <inkml:brushProperty name="ignorePressure" value="1"/>
+    </inkml:brush>
+  </inkml:definitions>
+  <inkml:trace contextRef="#ctx0" brushRef="#br0">25 74,'54'-1,"-1"-3,51-10,30 0,-71 10,1 2,1 4,16-1,-71 0,0 0,-1 1,1 0,0 1,-1-1,0 2,0 0,0 0,7 4,-7-3,1 0,-1-1,1 0,0 0,0-2,0 1,0-1,6 0,97 0,9-5,-108 2,0-1,0 0,0 0,-1-2,1 0,-1 0,0-1,0-1,3-2,-8 1,-18 5,-19 4,0 8,1 0,0 2,-9 7,6-4,0-2,-17 5,33-13,9-2,1-1,-1 0,0-1,1 1,-1-1,0 0,0 0,0-1,0 0,0 0,0 0,0-1,0 0,0 0,0 0,-5-3,-40-16,-2 2,0 2,-1 3,-45-5,12 9,-4 4,38 12,17-1,-129 19,144-23,1 1,0 1,-2 1,22-5,0 0,0 0,0 0,0 0,0 0,0 0,0 1,0-1,0 0,0 0,0 0,0 0,0 0,0 0,0 0,0 0,0 0,0 1,0-1,0 0,0 0,0 0,0 0,0 0,0 0,0 0,0 0,0 1,0-1,0 0,0 0,0 0,0 0,0 0,0 0,0 0,0 0,0 0,0 0,0 0,0 1,0-1,0 0,-1 0,1 0,0 0,0 0,0 0,0 0,0 0,0 0,0 0,0 0,0 0,-1 0,1 0,0 0,0 0,0 0,0 0,0 0,0 0,0 0,0 0,-1 0,1 0,0 0,12 3,16 0,60-4,-33-1,31 5,-39 2,53 2,-87-8,0 1,-1 1,1 0,-1 1,1 0,-1 1,1 0,4 2,-12-3,1 0,-1-1,1 0,-1 0,1 0,-1-1,1 0,0 0,-1-1,3 1,59-14,-21 3,-17 8,1 0,10 2,-12 1,0-2,19-3,-42 4,-1-1,0 0,0 0,0 0,0 0,0 0,-1-1,1 0,-1 0,1 0,-1 0,0 0,0-1,-1 1,2-3,0 1,-1 1,0 0,1 0,0 1,0-1,0 1,5-3,-7 5,0 0,0 0,0 1,0-1,1 1,-1-1,0 1,0 0,0 0,1 0,-1 0,0 0,0 0,0 1,1-1,-1 1,0 0,0-1,0 1,0 0,0 0,1 1,59 23,4 1,-110-23,3-2,-29 5,18-1,2 1,31-3,1-1,0-1,-1-1,1 0,0-1,-17-3,30 3,0 0,0 0,0-1,1 0,-1 1,0-1,1-1,-3-1,7 4,-1 0,1-1,0 1,-1 0,1-1,0 1,-1-1,1 1,0-1,-1 1,1-1,0 1,0-1,0 1,-1-1,1 1,0-1,0 1,0-1,0 1,0-1,0 1,0-1,0 0,0 1,0-1,0 1,1-1,0-1,0 1,0-1,0 0,0 1,0-1,1 0,-1 1,1 0,-1-1,1 1,-1 0,2-1,7-4,-1 0,1 0,0 1,1 0,-1 1,1 0,0 1,5-1,13-1,0 1,18 1,-17-3,-28 2,-18 2,-34 2,-37 7,13-1,46-3,0 1,1 2,0 1,-8 3,12-2,-1-1,0-2,0-1,0 0,-20-1,-7 4,36-3,38-2,38-2,-17 1,30-3,-34-4,20-1,110-5,-146 10,-14-1</inkml:trace>
+</inkml:ink>
+</file>
+
+<file path=ppt/ink/ink2.xml><?xml version="1.0" encoding="utf-8"?>
+<inkml:ink xmlns:inkml="http://www.w3.org/2003/InkML">
+  <inkml:definitions>
+    <inkml:context xml:id="ctx0">
+      <inkml:inkSource xml:id="inkSrc0">
+        <inkml:traceFormat>
+          <inkml:channel name="X" type="integer" min="-2.14748E9" max="2.14748E9" units="cm"/>
+          <inkml:channel name="Y" type="integer" min="-2.14748E9" max="2.14748E9" units="cm"/>
+        </inkml:traceFormat>
+        <inkml:channelProperties>
+          <inkml:channelProperty channel="X" name="resolution" value="1000" units="1/cm"/>
+          <inkml:channelProperty channel="Y" name="resolution" value="1000" units="1/cm"/>
+        </inkml:channelProperties>
+      </inkml:inkSource>
+      <inkml:timestamp xml:id="ts0" timeString="2019-09-25T15:41:38.194"/>
+    </inkml:context>
+    <inkml:brush xml:id="br0">
+      <inkml:brushProperty name="width" value="0.05" units="cm"/>
+      <inkml:brushProperty name="height" value="0.05" units="cm"/>
+      <inkml:brushProperty name="color" value="#E71224"/>
+      <inkml:brushProperty name="ignorePressure" value="1"/>
+    </inkml:brush>
+  </inkml:definitions>
+  <inkml:trace contextRef="#ctx0" brushRef="#br0">1 0,'0'0</inkml:trace>
+</inkml:ink>
+</file>
+
 <file path=ppt/slideLayouts/slideLayout1.xml><?xml version="1.0" encoding="utf-8"?>
 <p:sldLayout xmlns:a="http://schemas.openxmlformats.org/drawingml/2006/main" xmlns:r="http://schemas.openxmlformats.org/officeDocument/2006/relationships" xmlns:p="http://schemas.openxmlformats.org/presentationml/2006/main" showMasterSp="0" type="title" preserve="1">
   <p:cSld name="Title Slide">
@@ -9738,6 +9794,155 @@
       </p:grpSpPr>
       <p:pic>
         <p:nvPicPr>
+          <p:cNvPr id="3" name="Picture 2" descr="A picture containing pink, black, sitting&#10;&#10;Description automatically generated">
+            <a:extLst>
+              <a:ext uri="{FF2B5EF4-FFF2-40B4-BE49-F238E27FC236}">
+                <a16:creationId xmlns:a16="http://schemas.microsoft.com/office/drawing/2014/main" id="{EAD6781E-CB31-40F6-8853-B30951C75E28}"/>
+              </a:ext>
+            </a:extLst>
+          </p:cNvPr>
+          <p:cNvPicPr>
+            <a:picLocks noChangeAspect="1"/>
+          </p:cNvPicPr>
+          <p:nvPr/>
+        </p:nvPicPr>
+        <p:blipFill rotWithShape="1">
+          <a:blip r:embed="rId2">
+            <a:extLst>
+              <a:ext uri="{28A0092B-C50C-407E-A947-70E740481C1C}">
+                <a14:useLocalDpi xmlns:a14="http://schemas.microsoft.com/office/drawing/2010/main" val="0"/>
+              </a:ext>
+            </a:extLst>
+          </a:blip>
+          <a:srcRect t="41273" b="36888"/>
+          <a:stretch/>
+        </p:blipFill>
+        <p:spPr>
+          <a:xfrm>
+            <a:off x="643467" y="643467"/>
+            <a:ext cx="10905066" cy="5571066"/>
+          </a:xfrm>
+          <a:prstGeom prst="rect">
+            <a:avLst/>
+          </a:prstGeom>
+        </p:spPr>
+      </p:pic>
+    </p:spTree>
+    <p:extLst>
+      <p:ext uri="{BB962C8B-B14F-4D97-AF65-F5344CB8AC3E}">
+        <p14:creationId xmlns:p14="http://schemas.microsoft.com/office/powerpoint/2010/main" val="2402351973"/>
+      </p:ext>
+    </p:extLst>
+  </p:cSld>
+  <p:clrMapOvr>
+    <a:masterClrMapping/>
+  </p:clrMapOvr>
+</p:sld>
+</file>
+
+<file path=ppt/slides/slide11.xml><?xml version="1.0" encoding="utf-8"?>
+<p:sld xmlns:a="http://schemas.openxmlformats.org/drawingml/2006/main" xmlns:r="http://schemas.openxmlformats.org/officeDocument/2006/relationships" xmlns:p="http://schemas.openxmlformats.org/presentationml/2006/main">
+  <p:cSld>
+    <p:bg>
+      <p:bgPr>
+        <a:solidFill>
+          <a:schemeClr val="bg1"/>
+        </a:solidFill>
+        <a:effectLst/>
+      </p:bgPr>
+    </p:bg>
+    <p:spTree>
+      <p:nvGrpSpPr>
+        <p:cNvPr id="1" name=""/>
+        <p:cNvGrpSpPr/>
+        <p:nvPr/>
+      </p:nvGrpSpPr>
+      <p:grpSpPr>
+        <a:xfrm>
+          <a:off x="0" y="0"/>
+          <a:ext cx="0" cy="0"/>
+          <a:chOff x="0" y="0"/>
+          <a:chExt cx="0" cy="0"/>
+        </a:xfrm>
+      </p:grpSpPr>
+      <p:pic>
+        <p:nvPicPr>
+          <p:cNvPr id="5" name="Content Placeholder 4">
+            <a:extLst>
+              <a:ext uri="{FF2B5EF4-FFF2-40B4-BE49-F238E27FC236}">
+                <a16:creationId xmlns:a16="http://schemas.microsoft.com/office/drawing/2014/main" id="{19FFC643-C64E-468D-AB5C-FB0F6B60A664}"/>
+              </a:ext>
+            </a:extLst>
+          </p:cNvPr>
+          <p:cNvPicPr>
+            <a:picLocks noGrp="1" noChangeAspect="1"/>
+          </p:cNvPicPr>
+          <p:nvPr>
+            <p:ph idx="1"/>
+          </p:nvPr>
+        </p:nvPicPr>
+        <p:blipFill>
+          <a:blip r:embed="rId2">
+            <a:extLst>
+              <a:ext uri="{28A0092B-C50C-407E-A947-70E740481C1C}">
+                <a14:useLocalDpi xmlns:a14="http://schemas.microsoft.com/office/drawing/2010/main" val="0"/>
+              </a:ext>
+            </a:extLst>
+          </a:blip>
+          <a:stretch>
+            <a:fillRect/>
+          </a:stretch>
+        </p:blipFill>
+        <p:spPr>
+          <a:xfrm>
+            <a:off x="643467" y="702733"/>
+            <a:ext cx="10905066" cy="5452533"/>
+          </a:xfrm>
+          <a:prstGeom prst="rect">
+            <a:avLst/>
+          </a:prstGeom>
+        </p:spPr>
+      </p:pic>
+    </p:spTree>
+    <p:extLst>
+      <p:ext uri="{BB962C8B-B14F-4D97-AF65-F5344CB8AC3E}">
+        <p14:creationId xmlns:p14="http://schemas.microsoft.com/office/powerpoint/2010/main" val="3920103560"/>
+      </p:ext>
+    </p:extLst>
+  </p:cSld>
+  <p:clrMapOvr>
+    <a:masterClrMapping/>
+  </p:clrMapOvr>
+</p:sld>
+</file>
+
+<file path=ppt/slides/slide12.xml><?xml version="1.0" encoding="utf-8"?>
+<p:sld xmlns:a="http://schemas.openxmlformats.org/drawingml/2006/main" xmlns:r="http://schemas.openxmlformats.org/officeDocument/2006/relationships" xmlns:p="http://schemas.openxmlformats.org/presentationml/2006/main">
+  <p:cSld>
+    <p:bg>
+      <p:bgPr>
+        <a:solidFill>
+          <a:schemeClr val="bg1"/>
+        </a:solidFill>
+        <a:effectLst/>
+      </p:bgPr>
+    </p:bg>
+    <p:spTree>
+      <p:nvGrpSpPr>
+        <p:cNvPr id="1" name=""/>
+        <p:cNvGrpSpPr/>
+        <p:nvPr/>
+      </p:nvGrpSpPr>
+      <p:grpSpPr>
+        <a:xfrm>
+          <a:off x="0" y="0"/>
+          <a:ext cx="0" cy="0"/>
+          <a:chOff x="0" y="0"/>
+          <a:chExt cx="0" cy="0"/>
+        </a:xfrm>
+      </p:grpSpPr>
+      <p:pic>
+        <p:nvPicPr>
           <p:cNvPr id="3" name="Picture 2" descr="A picture containing vector graphics&#10;&#10;Description automatically generated">
             <a:extLst>
               <a:ext uri="{FF2B5EF4-FFF2-40B4-BE49-F238E27FC236}">
@@ -9785,7 +9990,7 @@
 </p:sld>
 </file>
 
-<file path=ppt/slides/slide11.xml><?xml version="1.0" encoding="utf-8"?>
+<file path=ppt/slides/slide13.xml><?xml version="1.0" encoding="utf-8"?>
 <p:sld xmlns:a="http://schemas.openxmlformats.org/drawingml/2006/main" xmlns:r="http://schemas.openxmlformats.org/officeDocument/2006/relationships" xmlns:p="http://schemas.openxmlformats.org/presentationml/2006/main">
   <p:cSld>
     <p:bg>
@@ -9859,7 +10064,7 @@
 </p:sld>
 </file>
 
-<file path=ppt/slides/slide12.xml><?xml version="1.0" encoding="utf-8"?>
+<file path=ppt/slides/slide14.xml><?xml version="1.0" encoding="utf-8"?>
 <p:sld xmlns:a="http://schemas.openxmlformats.org/drawingml/2006/main" xmlns:r="http://schemas.openxmlformats.org/officeDocument/2006/relationships" xmlns:p="http://schemas.openxmlformats.org/presentationml/2006/main">
   <p:cSld>
     <p:bg>
@@ -9933,7 +10138,7 @@
 </p:sld>
 </file>
 
-<file path=ppt/slides/slide13.xml><?xml version="1.0" encoding="utf-8"?>
+<file path=ppt/slides/slide15.xml><?xml version="1.0" encoding="utf-8"?>
 <p:sld xmlns:a="http://schemas.openxmlformats.org/drawingml/2006/main" xmlns:r="http://schemas.openxmlformats.org/officeDocument/2006/relationships" xmlns:p="http://schemas.openxmlformats.org/presentationml/2006/main">
   <p:cSld>
     <p:bg>
@@ -10007,7 +10212,7 @@
 </p:sld>
 </file>
 
-<file path=ppt/slides/slide14.xml><?xml version="1.0" encoding="utf-8"?>
+<file path=ppt/slides/slide16.xml><?xml version="1.0" encoding="utf-8"?>
 <p:sld xmlns:a="http://schemas.openxmlformats.org/drawingml/2006/main" xmlns:r="http://schemas.openxmlformats.org/officeDocument/2006/relationships" xmlns:p="http://schemas.openxmlformats.org/presentationml/2006/main">
   <p:cSld>
     <p:bg>
@@ -10114,7 +10319,7 @@
 </p:sld>
 </file>
 
-<file path=ppt/slides/slide15.xml><?xml version="1.0" encoding="utf-8"?>
+<file path=ppt/slides/slide17.xml><?xml version="1.0" encoding="utf-8"?>
 <p:sld xmlns:a="http://schemas.openxmlformats.org/drawingml/2006/main" xmlns:r="http://schemas.openxmlformats.org/officeDocument/2006/relationships" xmlns:p="http://schemas.openxmlformats.org/presentationml/2006/main">
   <p:cSld>
     <p:spTree>
@@ -10431,7 +10636,7 @@
 </p:sld>
 </file>
 
-<file path=ppt/slides/slide16.xml><?xml version="1.0" encoding="utf-8"?>
+<file path=ppt/slides/slide18.xml><?xml version="1.0" encoding="utf-8"?>
 <p:sld xmlns:a="http://schemas.openxmlformats.org/drawingml/2006/main" xmlns:r="http://schemas.openxmlformats.org/officeDocument/2006/relationships" xmlns:p="http://schemas.openxmlformats.org/presentationml/2006/main">
   <p:cSld>
     <p:spTree>
@@ -10564,6 +10769,462 @@
 <file path=ppt/slides/slide2.xml><?xml version="1.0" encoding="utf-8"?>
 <p:sld xmlns:a="http://schemas.openxmlformats.org/drawingml/2006/main" xmlns:r="http://schemas.openxmlformats.org/officeDocument/2006/relationships" xmlns:p="http://schemas.openxmlformats.org/presentationml/2006/main">
   <p:cSld>
+    <p:spTree>
+      <p:nvGrpSpPr>
+        <p:cNvPr id="1" name=""/>
+        <p:cNvGrpSpPr/>
+        <p:nvPr/>
+      </p:nvGrpSpPr>
+      <p:grpSpPr>
+        <a:xfrm>
+          <a:off x="0" y="0"/>
+          <a:ext cx="0" cy="0"/>
+          <a:chOff x="0" y="0"/>
+          <a:chExt cx="0" cy="0"/>
+        </a:xfrm>
+      </p:grpSpPr>
+      <p:sp>
+        <p:nvSpPr>
+          <p:cNvPr id="2" name="Title 1">
+            <a:extLst>
+              <a:ext uri="{FF2B5EF4-FFF2-40B4-BE49-F238E27FC236}">
+                <a16:creationId xmlns:a16="http://schemas.microsoft.com/office/drawing/2014/main" id="{F93F5598-5741-4058-8130-135DB1B99B29}"/>
+              </a:ext>
+            </a:extLst>
+          </p:cNvPr>
+          <p:cNvSpPr>
+            <a:spLocks noGrp="1"/>
+          </p:cNvSpPr>
+          <p:nvPr>
+            <p:ph type="title"/>
+          </p:nvPr>
+        </p:nvSpPr>
+        <p:spPr>
+          <a:xfrm>
+            <a:off x="1251678" y="382385"/>
+            <a:ext cx="10178322" cy="656302"/>
+          </a:xfrm>
+        </p:spPr>
+        <p:txBody>
+          <a:bodyPr>
+            <a:normAutofit/>
+          </a:bodyPr>
+          <a:lstStyle/>
+          <a:p>
+            <a:pPr algn="ctr"/>
+            <a:r>
+              <a:rPr lang="en-US" sz="2800" b="1" u="sng" dirty="0">
+                <a:solidFill>
+                  <a:schemeClr val="accent5">
+                    <a:lumMod val="50000"/>
+                  </a:schemeClr>
+                </a:solidFill>
+              </a:rPr>
+              <a:t>ETL Process</a:t>
+            </a:r>
+          </a:p>
+        </p:txBody>
+      </p:sp>
+      <p:pic>
+        <p:nvPicPr>
+          <p:cNvPr id="4" name="Content Placeholder 3">
+            <a:extLst>
+              <a:ext uri="{FF2B5EF4-FFF2-40B4-BE49-F238E27FC236}">
+                <a16:creationId xmlns:a16="http://schemas.microsoft.com/office/drawing/2014/main" id="{1B03BBCA-50FB-4C1E-84A1-46795B48182F}"/>
+              </a:ext>
+            </a:extLst>
+          </p:cNvPr>
+          <p:cNvPicPr>
+            <a:picLocks noGrp="1"/>
+          </p:cNvPicPr>
+          <p:nvPr>
+            <p:ph idx="1"/>
+          </p:nvPr>
+        </p:nvPicPr>
+        <p:blipFill rotWithShape="1">
+          <a:blip r:embed="rId2"/>
+          <a:srcRect l="19955" t="25553" r="20482" b="10484"/>
+          <a:stretch/>
+        </p:blipFill>
+        <p:spPr bwMode="auto">
+          <a:xfrm>
+            <a:off x="1251678" y="1038687"/>
+            <a:ext cx="6099033" cy="3258105"/>
+          </a:xfrm>
+          <a:prstGeom prst="rect">
+            <a:avLst/>
+          </a:prstGeom>
+          <a:ln>
+            <a:noFill/>
+          </a:ln>
+          <a:extLst>
+            <a:ext uri="{53640926-AAD7-44D8-BBD7-CCE9431645EC}">
+              <a14:shadowObscured xmlns:a14="http://schemas.microsoft.com/office/drawing/2010/main"/>
+            </a:ext>
+          </a:extLst>
+        </p:spPr>
+      </p:pic>
+      <p:sp>
+        <p:nvSpPr>
+          <p:cNvPr id="5" name="TextBox 4">
+            <a:extLst>
+              <a:ext uri="{FF2B5EF4-FFF2-40B4-BE49-F238E27FC236}">
+                <a16:creationId xmlns:a16="http://schemas.microsoft.com/office/drawing/2014/main" id="{EBE6369C-3907-4640-A163-CD81532E2792}"/>
+              </a:ext>
+            </a:extLst>
+          </p:cNvPr>
+          <p:cNvSpPr txBox="1"/>
+          <p:nvPr/>
+        </p:nvSpPr>
+        <p:spPr>
+          <a:xfrm>
+            <a:off x="8034291" y="1409889"/>
+            <a:ext cx="3021083" cy="1015663"/>
+          </a:xfrm>
+          <a:prstGeom prst="rect">
+            <a:avLst/>
+          </a:prstGeom>
+          <a:noFill/>
+        </p:spPr>
+        <p:txBody>
+          <a:bodyPr wrap="none" rtlCol="0">
+            <a:spAutoFit/>
+          </a:bodyPr>
+          <a:lstStyle/>
+          <a:p>
+            <a:r>
+              <a:rPr lang="en-US" sz="2000" dirty="0">
+                <a:solidFill>
+                  <a:schemeClr val="accent3">
+                    <a:lumMod val="75000"/>
+                  </a:schemeClr>
+                </a:solidFill>
+              </a:rPr>
+              <a:t>- </a:t>
+            </a:r>
+            <a:r>
+              <a:rPr lang="en-US" sz="2000" b="1" u="sng" dirty="0">
+                <a:solidFill>
+                  <a:schemeClr val="accent3">
+                    <a:lumMod val="75000"/>
+                  </a:schemeClr>
+                </a:solidFill>
+              </a:rPr>
+              <a:t>Kaggle.com</a:t>
+            </a:r>
+          </a:p>
+          <a:p>
+            <a:r>
+              <a:rPr lang="en-US" sz="2000" dirty="0">
+                <a:solidFill>
+                  <a:schemeClr val="accent3">
+                    <a:lumMod val="75000"/>
+                  </a:schemeClr>
+                </a:solidFill>
+              </a:rPr>
+              <a:t> CSV FILE with</a:t>
+            </a:r>
+          </a:p>
+          <a:p>
+            <a:r>
+              <a:rPr lang="en-US" sz="2000" dirty="0">
+                <a:solidFill>
+                  <a:schemeClr val="accent3">
+                    <a:lumMod val="75000"/>
+                  </a:schemeClr>
+                </a:solidFill>
+              </a:rPr>
+              <a:t>483819 rows × 12 columns</a:t>
+            </a:r>
+          </a:p>
+        </p:txBody>
+      </p:sp>
+      <p:sp>
+        <p:nvSpPr>
+          <p:cNvPr id="6" name="TextBox 5">
+            <a:extLst>
+              <a:ext uri="{FF2B5EF4-FFF2-40B4-BE49-F238E27FC236}">
+                <a16:creationId xmlns:a16="http://schemas.microsoft.com/office/drawing/2014/main" id="{F1EACB33-1BB2-4A7F-9156-391666084AD6}"/>
+              </a:ext>
+            </a:extLst>
+          </p:cNvPr>
+          <p:cNvSpPr txBox="1"/>
+          <p:nvPr/>
+        </p:nvSpPr>
+        <p:spPr>
+          <a:xfrm>
+            <a:off x="7666738" y="2966445"/>
+            <a:ext cx="4027064" cy="707886"/>
+          </a:xfrm>
+          <a:prstGeom prst="rect">
+            <a:avLst/>
+          </a:prstGeom>
+          <a:noFill/>
+        </p:spPr>
+        <p:txBody>
+          <a:bodyPr wrap="none" rtlCol="0">
+            <a:spAutoFit/>
+          </a:bodyPr>
+          <a:lstStyle/>
+          <a:p>
+            <a:r>
+              <a:rPr lang="en-US" sz="2000" dirty="0">
+                <a:solidFill>
+                  <a:schemeClr val="accent3">
+                    <a:lumMod val="75000"/>
+                  </a:schemeClr>
+                </a:solidFill>
+              </a:rPr>
+              <a:t>- After dropping duplicates and NAN</a:t>
+            </a:r>
+          </a:p>
+          <a:p>
+            <a:r>
+              <a:rPr lang="en-US" sz="2000" b="1" u="sng" dirty="0">
+                <a:solidFill>
+                  <a:schemeClr val="accent3">
+                    <a:lumMod val="75000"/>
+                  </a:schemeClr>
+                </a:solidFill>
+              </a:rPr>
+              <a:t>  147936 rows × 12 columns</a:t>
+            </a:r>
+          </a:p>
+        </p:txBody>
+      </p:sp>
+      <p:pic>
+        <p:nvPicPr>
+          <p:cNvPr id="7" name="Picture 6">
+            <a:extLst>
+              <a:ext uri="{FF2B5EF4-FFF2-40B4-BE49-F238E27FC236}">
+                <a16:creationId xmlns:a16="http://schemas.microsoft.com/office/drawing/2014/main" id="{191185D3-026B-4C9A-8909-17578DC2E1F4}"/>
+              </a:ext>
+            </a:extLst>
+          </p:cNvPr>
+          <p:cNvPicPr/>
+          <p:nvPr/>
+        </p:nvPicPr>
+        <p:blipFill rotWithShape="1">
+          <a:blip r:embed="rId3"/>
+          <a:srcRect l="22153" t="49587" r="27083" b="25000"/>
+          <a:stretch/>
+        </p:blipFill>
+        <p:spPr bwMode="auto">
+          <a:xfrm>
+            <a:off x="1251678" y="4837685"/>
+            <a:ext cx="6498430" cy="1225764"/>
+          </a:xfrm>
+          <a:prstGeom prst="rect">
+            <a:avLst/>
+          </a:prstGeom>
+          <a:ln>
+            <a:noFill/>
+          </a:ln>
+          <a:extLst>
+            <a:ext uri="{53640926-AAD7-44D8-BBD7-CCE9431645EC}">
+              <a14:shadowObscured xmlns:a14="http://schemas.microsoft.com/office/drawing/2010/main"/>
+            </a:ext>
+          </a:extLst>
+        </p:spPr>
+      </p:pic>
+      <mc:AlternateContent xmlns:mc="http://schemas.openxmlformats.org/markup-compatibility/2006">
+        <mc:Choice xmlns:p14="http://schemas.microsoft.com/office/powerpoint/2010/main" Requires="p14">
+          <p:contentPart p14:bwMode="auto" r:id="rId4">
+            <p14:nvContentPartPr>
+              <p14:cNvPr id="8" name="Ink 7">
+                <a:extLst>
+                  <a:ext uri="{FF2B5EF4-FFF2-40B4-BE49-F238E27FC236}">
+                    <a16:creationId xmlns:a16="http://schemas.microsoft.com/office/drawing/2014/main" id="{60B2C35B-4CA4-48E3-813F-ED8A0111D4DC}"/>
+                  </a:ext>
+                </a:extLst>
+              </p14:cNvPr>
+              <p14:cNvContentPartPr/>
+              <p14:nvPr/>
+            </p14:nvContentPartPr>
+            <p14:xfrm>
+              <a:off x="3552030" y="5217639"/>
+              <a:ext cx="438840" cy="60840"/>
+            </p14:xfrm>
+          </p:contentPart>
+        </mc:Choice>
+        <mc:Fallback>
+          <p:pic>
+            <p:nvPicPr>
+              <p:cNvPr id="8" name="Ink 7">
+                <a:extLst>
+                  <a:ext uri="{FF2B5EF4-FFF2-40B4-BE49-F238E27FC236}">
+                    <a16:creationId xmlns:a16="http://schemas.microsoft.com/office/drawing/2014/main" id="{60B2C35B-4CA4-48E3-813F-ED8A0111D4DC}"/>
+                  </a:ext>
+                </a:extLst>
+              </p:cNvPr>
+              <p:cNvPicPr/>
+              <p:nvPr/>
+            </p:nvPicPr>
+            <p:blipFill>
+              <a:blip r:embed="rId5"/>
+              <a:stretch>
+                <a:fillRect/>
+              </a:stretch>
+            </p:blipFill>
+            <p:spPr>
+              <a:xfrm>
+                <a:off x="3543030" y="5208999"/>
+                <a:ext cx="456480" cy="78480"/>
+              </a:xfrm>
+              <a:prstGeom prst="rect">
+                <a:avLst/>
+              </a:prstGeom>
+            </p:spPr>
+          </p:pic>
+        </mc:Fallback>
+      </mc:AlternateContent>
+      <mc:AlternateContent xmlns:mc="http://schemas.openxmlformats.org/markup-compatibility/2006">
+        <mc:Choice xmlns:p14="http://schemas.microsoft.com/office/powerpoint/2010/main" Requires="p14">
+          <p:contentPart p14:bwMode="auto" r:id="rId6">
+            <p14:nvContentPartPr>
+              <p14:cNvPr id="9" name="Ink 8">
+                <a:extLst>
+                  <a:ext uri="{FF2B5EF4-FFF2-40B4-BE49-F238E27FC236}">
+                    <a16:creationId xmlns:a16="http://schemas.microsoft.com/office/drawing/2014/main" id="{644934C5-1E72-4C35-AEEF-85DD92A636C0}"/>
+                  </a:ext>
+                </a:extLst>
+              </p14:cNvPr>
+              <p14:cNvContentPartPr/>
+              <p14:nvPr/>
+            </p14:nvContentPartPr>
+            <p14:xfrm>
+              <a:off x="5279781" y="2796755"/>
+              <a:ext cx="360" cy="360"/>
+            </p14:xfrm>
+          </p:contentPart>
+        </mc:Choice>
+        <mc:Fallback>
+          <p:pic>
+            <p:nvPicPr>
+              <p:cNvPr id="9" name="Ink 8">
+                <a:extLst>
+                  <a:ext uri="{FF2B5EF4-FFF2-40B4-BE49-F238E27FC236}">
+                    <a16:creationId xmlns:a16="http://schemas.microsoft.com/office/drawing/2014/main" id="{644934C5-1E72-4C35-AEEF-85DD92A636C0}"/>
+                  </a:ext>
+                </a:extLst>
+              </p:cNvPr>
+              <p:cNvPicPr/>
+              <p:nvPr/>
+            </p:nvPicPr>
+            <p:blipFill>
+              <a:blip r:embed="rId7"/>
+              <a:stretch>
+                <a:fillRect/>
+              </a:stretch>
+            </p:blipFill>
+            <p:spPr>
+              <a:xfrm>
+                <a:off x="5271141" y="2787755"/>
+                <a:ext cx="18000" cy="18000"/>
+              </a:xfrm>
+              <a:prstGeom prst="rect">
+                <a:avLst/>
+              </a:prstGeom>
+            </p:spPr>
+          </p:pic>
+        </mc:Fallback>
+      </mc:AlternateContent>
+    </p:spTree>
+    <p:extLst>
+      <p:ext uri="{BB962C8B-B14F-4D97-AF65-F5344CB8AC3E}">
+        <p14:creationId xmlns:p14="http://schemas.microsoft.com/office/powerpoint/2010/main" val="2307480297"/>
+      </p:ext>
+    </p:extLst>
+  </p:cSld>
+  <p:clrMapOvr>
+    <a:masterClrMapping/>
+  </p:clrMapOvr>
+</p:sld>
+</file>
+
+<file path=ppt/slides/slide3.xml><?xml version="1.0" encoding="utf-8"?>
+<p:sld xmlns:a="http://schemas.openxmlformats.org/drawingml/2006/main" xmlns:r="http://schemas.openxmlformats.org/officeDocument/2006/relationships" xmlns:p="http://schemas.openxmlformats.org/presentationml/2006/main">
+  <p:cSld>
+    <p:spTree>
+      <p:nvGrpSpPr>
+        <p:cNvPr id="1" name=""/>
+        <p:cNvGrpSpPr/>
+        <p:nvPr/>
+      </p:nvGrpSpPr>
+      <p:grpSpPr>
+        <a:xfrm>
+          <a:off x="0" y="0"/>
+          <a:ext cx="0" cy="0"/>
+          <a:chOff x="0" y="0"/>
+          <a:chExt cx="0" cy="0"/>
+        </a:xfrm>
+      </p:grpSpPr>
+      <p:sp>
+        <p:nvSpPr>
+          <p:cNvPr id="2" name="Title 1">
+            <a:extLst>
+              <a:ext uri="{FF2B5EF4-FFF2-40B4-BE49-F238E27FC236}">
+                <a16:creationId xmlns:a16="http://schemas.microsoft.com/office/drawing/2014/main" id="{5C933B18-E983-4C32-99E5-FD0FB249A96F}"/>
+              </a:ext>
+            </a:extLst>
+          </p:cNvPr>
+          <p:cNvSpPr>
+            <a:spLocks noGrp="1"/>
+          </p:cNvSpPr>
+          <p:nvPr>
+            <p:ph type="title"/>
+          </p:nvPr>
+        </p:nvSpPr>
+        <p:spPr/>
+        <p:txBody>
+          <a:bodyPr/>
+          <a:lstStyle/>
+          <a:p>
+            <a:endParaRPr lang="en-US"/>
+          </a:p>
+        </p:txBody>
+      </p:sp>
+      <p:sp>
+        <p:nvSpPr>
+          <p:cNvPr id="3" name="Content Placeholder 2">
+            <a:extLst>
+              <a:ext uri="{FF2B5EF4-FFF2-40B4-BE49-F238E27FC236}">
+                <a16:creationId xmlns:a16="http://schemas.microsoft.com/office/drawing/2014/main" id="{68A36D67-6295-488C-A801-BA05AF683CA0}"/>
+              </a:ext>
+            </a:extLst>
+          </p:cNvPr>
+          <p:cNvSpPr>
+            <a:spLocks noGrp="1"/>
+          </p:cNvSpPr>
+          <p:nvPr>
+            <p:ph idx="1"/>
+          </p:nvPr>
+        </p:nvSpPr>
+        <p:spPr/>
+        <p:txBody>
+          <a:bodyPr/>
+          <a:lstStyle/>
+          <a:p>
+            <a:endParaRPr lang="en-US"/>
+          </a:p>
+        </p:txBody>
+      </p:sp>
+    </p:spTree>
+    <p:extLst>
+      <p:ext uri="{BB962C8B-B14F-4D97-AF65-F5344CB8AC3E}">
+        <p14:creationId xmlns:p14="http://schemas.microsoft.com/office/powerpoint/2010/main" val="539390183"/>
+      </p:ext>
+    </p:extLst>
+  </p:cSld>
+  <p:clrMapOvr>
+    <a:masterClrMapping/>
+  </p:clrMapOvr>
+</p:sld>
+</file>
+
+<file path=ppt/slides/slide4.xml><?xml version="1.0" encoding="utf-8"?>
+<p:sld xmlns:a="http://schemas.openxmlformats.org/drawingml/2006/main" xmlns:r="http://schemas.openxmlformats.org/officeDocument/2006/relationships" xmlns:p="http://schemas.openxmlformats.org/presentationml/2006/main">
+  <p:cSld>
     <p:bg>
       <p:bgPr>
         <a:solidFill>
@@ -10677,7 +11338,7 @@
 </p:sld>
 </file>
 
-<file path=ppt/slides/slide3.xml><?xml version="1.0" encoding="utf-8"?>
+<file path=ppt/slides/slide5.xml><?xml version="1.0" encoding="utf-8"?>
 <p:sld xmlns:a="http://schemas.openxmlformats.org/drawingml/2006/main" xmlns:r="http://schemas.openxmlformats.org/officeDocument/2006/relationships" xmlns:p="http://schemas.openxmlformats.org/presentationml/2006/main">
   <p:cSld>
     <p:bg>
@@ -10828,7 +11489,7 @@
 </p:sld>
 </file>
 
-<file path=ppt/slides/slide4.xml><?xml version="1.0" encoding="utf-8"?>
+<file path=ppt/slides/slide6.xml><?xml version="1.0" encoding="utf-8"?>
 <p:sld xmlns:a="http://schemas.openxmlformats.org/drawingml/2006/main" xmlns:r="http://schemas.openxmlformats.org/officeDocument/2006/relationships" xmlns:p="http://schemas.openxmlformats.org/presentationml/2006/main">
   <p:cSld>
     <p:bg>
@@ -10902,7 +11563,7 @@
 </p:sld>
 </file>
 
-<file path=ppt/slides/slide5.xml><?xml version="1.0" encoding="utf-8"?>
+<file path=ppt/slides/slide7.xml><?xml version="1.0" encoding="utf-8"?>
 <p:sld xmlns:a="http://schemas.openxmlformats.org/drawingml/2006/main" xmlns:r="http://schemas.openxmlformats.org/officeDocument/2006/relationships" xmlns:p="http://schemas.openxmlformats.org/presentationml/2006/main">
   <p:cSld>
     <p:bg>
@@ -11017,7 +11678,7 @@
 </p:sld>
 </file>
 
-<file path=ppt/slides/slide6.xml><?xml version="1.0" encoding="utf-8"?>
+<file path=ppt/slides/slide8.xml><?xml version="1.0" encoding="utf-8"?>
 <p:sld xmlns:a="http://schemas.openxmlformats.org/drawingml/2006/main" xmlns:r="http://schemas.openxmlformats.org/officeDocument/2006/relationships" xmlns:p="http://schemas.openxmlformats.org/presentationml/2006/main">
   <p:cSld>
     <p:bg>
@@ -11091,7 +11752,7 @@
 </p:sld>
 </file>
 
-<file path=ppt/slides/slide7.xml><?xml version="1.0" encoding="utf-8"?>
+<file path=ppt/slides/slide9.xml><?xml version="1.0" encoding="utf-8"?>
 <p:sld xmlns:a="http://schemas.openxmlformats.org/drawingml/2006/main" xmlns:r="http://schemas.openxmlformats.org/officeDocument/2006/relationships" xmlns:p="http://schemas.openxmlformats.org/presentationml/2006/main">
   <p:cSld>
     <p:bg>
@@ -11156,155 +11817,6 @@
     <p:extLst>
       <p:ext uri="{BB962C8B-B14F-4D97-AF65-F5344CB8AC3E}">
         <p14:creationId xmlns:p14="http://schemas.microsoft.com/office/powerpoint/2010/main" val="96831657"/>
-      </p:ext>
-    </p:extLst>
-  </p:cSld>
-  <p:clrMapOvr>
-    <a:masterClrMapping/>
-  </p:clrMapOvr>
-</p:sld>
-</file>
-
-<file path=ppt/slides/slide8.xml><?xml version="1.0" encoding="utf-8"?>
-<p:sld xmlns:a="http://schemas.openxmlformats.org/drawingml/2006/main" xmlns:r="http://schemas.openxmlformats.org/officeDocument/2006/relationships" xmlns:p="http://schemas.openxmlformats.org/presentationml/2006/main">
-  <p:cSld>
-    <p:bg>
-      <p:bgPr>
-        <a:solidFill>
-          <a:schemeClr val="bg1"/>
-        </a:solidFill>
-        <a:effectLst/>
-      </p:bgPr>
-    </p:bg>
-    <p:spTree>
-      <p:nvGrpSpPr>
-        <p:cNvPr id="1" name=""/>
-        <p:cNvGrpSpPr/>
-        <p:nvPr/>
-      </p:nvGrpSpPr>
-      <p:grpSpPr>
-        <a:xfrm>
-          <a:off x="0" y="0"/>
-          <a:ext cx="0" cy="0"/>
-          <a:chOff x="0" y="0"/>
-          <a:chExt cx="0" cy="0"/>
-        </a:xfrm>
-      </p:grpSpPr>
-      <p:pic>
-        <p:nvPicPr>
-          <p:cNvPr id="3" name="Picture 2" descr="A picture containing pink, black, sitting&#10;&#10;Description automatically generated">
-            <a:extLst>
-              <a:ext uri="{FF2B5EF4-FFF2-40B4-BE49-F238E27FC236}">
-                <a16:creationId xmlns:a16="http://schemas.microsoft.com/office/drawing/2014/main" id="{EAD6781E-CB31-40F6-8853-B30951C75E28}"/>
-              </a:ext>
-            </a:extLst>
-          </p:cNvPr>
-          <p:cNvPicPr>
-            <a:picLocks noChangeAspect="1"/>
-          </p:cNvPicPr>
-          <p:nvPr/>
-        </p:nvPicPr>
-        <p:blipFill rotWithShape="1">
-          <a:blip r:embed="rId2">
-            <a:extLst>
-              <a:ext uri="{28A0092B-C50C-407E-A947-70E740481C1C}">
-                <a14:useLocalDpi xmlns:a14="http://schemas.microsoft.com/office/drawing/2010/main" val="0"/>
-              </a:ext>
-            </a:extLst>
-          </a:blip>
-          <a:srcRect t="41273" b="36888"/>
-          <a:stretch/>
-        </p:blipFill>
-        <p:spPr>
-          <a:xfrm>
-            <a:off x="643467" y="643467"/>
-            <a:ext cx="10905066" cy="5571066"/>
-          </a:xfrm>
-          <a:prstGeom prst="rect">
-            <a:avLst/>
-          </a:prstGeom>
-        </p:spPr>
-      </p:pic>
-    </p:spTree>
-    <p:extLst>
-      <p:ext uri="{BB962C8B-B14F-4D97-AF65-F5344CB8AC3E}">
-        <p14:creationId xmlns:p14="http://schemas.microsoft.com/office/powerpoint/2010/main" val="2402351973"/>
-      </p:ext>
-    </p:extLst>
-  </p:cSld>
-  <p:clrMapOvr>
-    <a:masterClrMapping/>
-  </p:clrMapOvr>
-</p:sld>
-</file>
-
-<file path=ppt/slides/slide9.xml><?xml version="1.0" encoding="utf-8"?>
-<p:sld xmlns:a="http://schemas.openxmlformats.org/drawingml/2006/main" xmlns:r="http://schemas.openxmlformats.org/officeDocument/2006/relationships" xmlns:p="http://schemas.openxmlformats.org/presentationml/2006/main">
-  <p:cSld>
-    <p:bg>
-      <p:bgPr>
-        <a:solidFill>
-          <a:schemeClr val="bg1"/>
-        </a:solidFill>
-        <a:effectLst/>
-      </p:bgPr>
-    </p:bg>
-    <p:spTree>
-      <p:nvGrpSpPr>
-        <p:cNvPr id="1" name=""/>
-        <p:cNvGrpSpPr/>
-        <p:nvPr/>
-      </p:nvGrpSpPr>
-      <p:grpSpPr>
-        <a:xfrm>
-          <a:off x="0" y="0"/>
-          <a:ext cx="0" cy="0"/>
-          <a:chOff x="0" y="0"/>
-          <a:chExt cx="0" cy="0"/>
-        </a:xfrm>
-      </p:grpSpPr>
-      <p:pic>
-        <p:nvPicPr>
-          <p:cNvPr id="5" name="Content Placeholder 4">
-            <a:extLst>
-              <a:ext uri="{FF2B5EF4-FFF2-40B4-BE49-F238E27FC236}">
-                <a16:creationId xmlns:a16="http://schemas.microsoft.com/office/drawing/2014/main" id="{19FFC643-C64E-468D-AB5C-FB0F6B60A664}"/>
-              </a:ext>
-            </a:extLst>
-          </p:cNvPr>
-          <p:cNvPicPr>
-            <a:picLocks noGrp="1" noChangeAspect="1"/>
-          </p:cNvPicPr>
-          <p:nvPr>
-            <p:ph idx="1"/>
-          </p:nvPr>
-        </p:nvPicPr>
-        <p:blipFill>
-          <a:blip r:embed="rId2">
-            <a:extLst>
-              <a:ext uri="{28A0092B-C50C-407E-A947-70E740481C1C}">
-                <a14:useLocalDpi xmlns:a14="http://schemas.microsoft.com/office/drawing/2010/main" val="0"/>
-              </a:ext>
-            </a:extLst>
-          </a:blip>
-          <a:stretch>
-            <a:fillRect/>
-          </a:stretch>
-        </p:blipFill>
-        <p:spPr>
-          <a:xfrm>
-            <a:off x="643467" y="702733"/>
-            <a:ext cx="10905066" cy="5452533"/>
-          </a:xfrm>
-          <a:prstGeom prst="rect">
-            <a:avLst/>
-          </a:prstGeom>
-        </p:spPr>
-      </p:pic>
-    </p:spTree>
-    <p:extLst>
-      <p:ext uri="{BB962C8B-B14F-4D97-AF65-F5344CB8AC3E}">
-        <p14:creationId xmlns:p14="http://schemas.microsoft.com/office/powerpoint/2010/main" val="3920103560"/>
       </p:ext>
     </p:extLst>
   </p:cSld>

</xml_diff>